<commit_message>
Empathy map more specific
</commit_message>
<xml_diff>
--- a/Empathy Map.pptx
+++ b/Empathy Map.pptx
@@ -274,7 +274,7 @@
               <a:pPr>
                 <a:defRPr/>
               </a:pPr>
-              <a:t>19.09.2023</a:t>
+              <a:t>21.09.2023</a:t>
             </a:fld>
             <a:endParaRPr lang="de-DE"/>
           </a:p>
@@ -473,7 +473,7 @@
               <a:pPr>
                 <a:defRPr/>
               </a:pPr>
-              <a:t>19.09.2023</a:t>
+              <a:t>21.09.2023</a:t>
             </a:fld>
             <a:endParaRPr lang="de-DE"/>
           </a:p>
@@ -3524,7 +3524,7 @@
         </p:nvSpPr>
         <p:spPr>
           <a:xfrm>
-            <a:off x="2656384" y="545023"/>
+            <a:off x="2612236" y="467277"/>
             <a:ext cx="1656184" cy="1080120"/>
           </a:xfrm>
           <a:prstGeom prst="rect">
@@ -3574,7 +3574,7 @@
                   </a:outerShdw>
                 </a:effectLst>
               </a:rPr>
-              <a:t>Likes </a:t>
+              <a:t>„Learning </a:t>
             </a:r>
             <a:r>
               <a:rPr lang="de-DE" dirty="0" err="1">
@@ -3590,7 +3590,7 @@
                   </a:outerShdw>
                 </a:effectLst>
               </a:rPr>
-              <a:t>to</a:t>
+              <a:t>this</a:t>
             </a:r>
             <a:r>
               <a:rPr lang="de-DE" dirty="0">
@@ -3622,21 +3622,88 @@
                   </a:outerShdw>
                 </a:effectLst>
               </a:rPr>
-              <a:t>learn</a:t>
-            </a:r>
-            <a:endParaRPr lang="de-DE" dirty="0">
-              <a:ln w="0"/>
-              <a:solidFill>
-                <a:schemeClr val="tx1"/>
-              </a:solidFill>
-              <a:effectLst>
-                <a:outerShdw blurRad="38100" dist="19050" dir="2700000" algn="tl" rotWithShape="0">
-                  <a:schemeClr val="dk1">
-                    <a:alpha val="40000"/>
-                  </a:schemeClr>
-                </a:outerShdw>
-              </a:effectLst>
-            </a:endParaRPr>
+              <a:t>stuff</a:t>
+            </a:r>
+            <a:r>
+              <a:rPr lang="de-DE" dirty="0">
+                <a:ln w="0"/>
+                <a:solidFill>
+                  <a:schemeClr val="tx1"/>
+                </a:solidFill>
+                <a:effectLst>
+                  <a:outerShdw blurRad="38100" dist="19050" dir="2700000" algn="tl" rotWithShape="0">
+                    <a:schemeClr val="dk1">
+                      <a:alpha val="40000"/>
+                    </a:schemeClr>
+                  </a:outerShdw>
+                </a:effectLst>
+              </a:rPr>
+              <a:t> </a:t>
+            </a:r>
+            <a:r>
+              <a:rPr lang="de-DE" dirty="0" err="1">
+                <a:ln w="0"/>
+                <a:solidFill>
+                  <a:schemeClr val="tx1"/>
+                </a:solidFill>
+                <a:effectLst>
+                  <a:outerShdw blurRad="38100" dist="19050" dir="2700000" algn="tl" rotWithShape="0">
+                    <a:schemeClr val="dk1">
+                      <a:alpha val="40000"/>
+                    </a:schemeClr>
+                  </a:outerShdw>
+                </a:effectLst>
+              </a:rPr>
+              <a:t>is</a:t>
+            </a:r>
+            <a:r>
+              <a:rPr lang="de-DE" dirty="0">
+                <a:ln w="0"/>
+                <a:solidFill>
+                  <a:schemeClr val="tx1"/>
+                </a:solidFill>
+                <a:effectLst>
+                  <a:outerShdw blurRad="38100" dist="19050" dir="2700000" algn="tl" rotWithShape="0">
+                    <a:schemeClr val="dk1">
+                      <a:alpha val="40000"/>
+                    </a:schemeClr>
+                  </a:outerShdw>
+                </a:effectLst>
+              </a:rPr>
+              <a:t> </a:t>
+            </a:r>
+            <a:r>
+              <a:rPr lang="de-DE" dirty="0" err="1">
+                <a:ln w="0"/>
+                <a:solidFill>
+                  <a:schemeClr val="tx1"/>
+                </a:solidFill>
+                <a:effectLst>
+                  <a:outerShdw blurRad="38100" dist="19050" dir="2700000" algn="tl" rotWithShape="0">
+                    <a:schemeClr val="dk1">
+                      <a:alpha val="40000"/>
+                    </a:schemeClr>
+                  </a:outerShdw>
+                </a:effectLst>
+              </a:rPr>
+              <a:t>fun</a:t>
+            </a:r>
+            <a:r>
+              <a:rPr lang="de-DE" dirty="0">
+                <a:ln w="0"/>
+                <a:solidFill>
+                  <a:schemeClr val="tx1"/>
+                </a:solidFill>
+                <a:effectLst>
+                  <a:outerShdw blurRad="38100" dist="19050" dir="2700000" algn="tl" rotWithShape="0">
+                    <a:schemeClr val="dk1">
+                      <a:alpha val="40000"/>
+                    </a:schemeClr>
+                  </a:outerShdw>
+                </a:effectLst>
+              </a:rPr>
+              <a:t>“</a:t>
+            </a:r>
           </a:p>
         </p:txBody>
       </p:sp>
@@ -3654,7 +3721,7 @@
         </p:nvSpPr>
         <p:spPr>
           <a:xfrm>
-            <a:off x="4744616" y="604845"/>
+            <a:off x="4751996" y="565805"/>
             <a:ext cx="1872208" cy="1435617"/>
           </a:xfrm>
           <a:prstGeom prst="rect">
@@ -3691,6 +3758,22 @@
           <a:p>
             <a:pPr algn="ctr"/>
             <a:r>
+              <a:rPr lang="de-DE" dirty="0">
+                <a:ln w="0"/>
+                <a:solidFill>
+                  <a:schemeClr val="tx1"/>
+                </a:solidFill>
+                <a:effectLst>
+                  <a:outerShdw blurRad="38100" dist="19050" dir="2700000" algn="tl" rotWithShape="0">
+                    <a:schemeClr val="dk1">
+                      <a:alpha val="40000"/>
+                    </a:schemeClr>
+                  </a:outerShdw>
+                </a:effectLst>
+              </a:rPr>
+              <a:t>„</a:t>
+            </a:r>
+            <a:r>
               <a:rPr lang="de-DE" dirty="0" err="1">
                 <a:ln w="0"/>
                 <a:solidFill>
@@ -3704,7 +3787,7 @@
                   </a:outerShdw>
                 </a:effectLst>
               </a:rPr>
-              <a:t>Thinks</a:t>
+              <a:t>Moodle</a:t>
             </a:r>
             <a:r>
               <a:rPr lang="de-DE" dirty="0">
@@ -3736,7 +3819,7 @@
                   </a:outerShdw>
                 </a:effectLst>
               </a:rPr>
-              <a:t>Moodle</a:t>
+              <a:t>is</a:t>
             </a:r>
             <a:r>
               <a:rPr lang="de-DE" dirty="0">
@@ -3768,7 +3851,7 @@
                   </a:outerShdw>
                 </a:effectLst>
               </a:rPr>
-              <a:t>is</a:t>
+              <a:t>really</a:t>
             </a:r>
             <a:r>
               <a:rPr lang="de-DE" dirty="0">
@@ -3866,19 +3949,22 @@
               </a:rPr>
               <a:t>use</a:t>
             </a:r>
-            <a:endParaRPr lang="de-DE" dirty="0">
-              <a:ln w="0"/>
-              <a:solidFill>
-                <a:schemeClr val="tx1"/>
-              </a:solidFill>
-              <a:effectLst>
-                <a:outerShdw blurRad="38100" dist="19050" dir="2700000" algn="tl" rotWithShape="0">
-                  <a:schemeClr val="dk1">
-                    <a:alpha val="40000"/>
-                  </a:schemeClr>
-                </a:outerShdw>
-              </a:effectLst>
-            </a:endParaRPr>
+            <a:r>
+              <a:rPr lang="de-DE" dirty="0">
+                <a:ln w="0"/>
+                <a:solidFill>
+                  <a:schemeClr val="tx1"/>
+                </a:solidFill>
+                <a:effectLst>
+                  <a:outerShdw blurRad="38100" dist="19050" dir="2700000" algn="tl" rotWithShape="0">
+                    <a:schemeClr val="dk1">
+                      <a:alpha val="40000"/>
+                    </a:schemeClr>
+                  </a:outerShdw>
+                </a:effectLst>
+              </a:rPr>
+              <a:t>“</a:t>
+            </a:r>
           </a:p>
         </p:txBody>
       </p:sp>
@@ -4129,8 +4215,8 @@
         </p:nvSpPr>
         <p:spPr>
           <a:xfrm>
-            <a:off x="1288232" y="2361128"/>
-            <a:ext cx="1656184" cy="1080120"/>
+            <a:off x="562344" y="1762036"/>
+            <a:ext cx="2244462" cy="1594211"/>
           </a:xfrm>
           <a:prstGeom prst="rect">
             <a:avLst/>
@@ -4179,7 +4265,103 @@
                   </a:outerShdw>
                 </a:effectLst>
               </a:rPr>
-              <a:t>Teachers</a:t>
+              <a:t>„Use </a:t>
+            </a:r>
+            <a:r>
+              <a:rPr lang="de-DE" dirty="0" err="1">
+                <a:ln w="0"/>
+                <a:solidFill>
+                  <a:schemeClr val="tx1"/>
+                </a:solidFill>
+                <a:effectLst>
+                  <a:outerShdw blurRad="38100" dist="19050" dir="2700000" algn="tl" rotWithShape="0">
+                    <a:schemeClr val="dk1">
+                      <a:alpha val="40000"/>
+                    </a:schemeClr>
+                  </a:outerShdw>
+                </a:effectLst>
+              </a:rPr>
+              <a:t>the</a:t>
+            </a:r>
+            <a:r>
+              <a:rPr lang="de-DE" dirty="0">
+                <a:ln w="0"/>
+                <a:solidFill>
+                  <a:schemeClr val="tx1"/>
+                </a:solidFill>
+                <a:effectLst>
+                  <a:outerShdw blurRad="38100" dist="19050" dir="2700000" algn="tl" rotWithShape="0">
+                    <a:schemeClr val="dk1">
+                      <a:alpha val="40000"/>
+                    </a:schemeClr>
+                  </a:outerShdw>
+                </a:effectLst>
+              </a:rPr>
+              <a:t> </a:t>
+            </a:r>
+            <a:r>
+              <a:rPr lang="de-DE" dirty="0" err="1">
+                <a:ln w="0"/>
+                <a:solidFill>
+                  <a:schemeClr val="tx1"/>
+                </a:solidFill>
+                <a:effectLst>
+                  <a:outerShdw blurRad="38100" dist="19050" dir="2700000" algn="tl" rotWithShape="0">
+                    <a:schemeClr val="dk1">
+                      <a:alpha val="40000"/>
+                    </a:schemeClr>
+                  </a:outerShdw>
+                </a:effectLst>
+              </a:rPr>
+              <a:t>requirements</a:t>
+            </a:r>
+            <a:r>
+              <a:rPr lang="de-DE" dirty="0">
+                <a:ln w="0"/>
+                <a:solidFill>
+                  <a:schemeClr val="tx1"/>
+                </a:solidFill>
+                <a:effectLst>
+                  <a:outerShdw blurRad="38100" dist="19050" dir="2700000" algn="tl" rotWithShape="0">
+                    <a:schemeClr val="dk1">
+                      <a:alpha val="40000"/>
+                    </a:schemeClr>
+                  </a:outerShdw>
+                </a:effectLst>
+              </a:rPr>
+              <a:t> on </a:t>
+            </a:r>
+            <a:r>
+              <a:rPr lang="de-DE" dirty="0" err="1">
+                <a:ln w="0"/>
+                <a:solidFill>
+                  <a:schemeClr val="tx1"/>
+                </a:solidFill>
+                <a:effectLst>
+                  <a:outerShdw blurRad="38100" dist="19050" dir="2700000" algn="tl" rotWithShape="0">
+                    <a:schemeClr val="dk1">
+                      <a:alpha val="40000"/>
+                    </a:schemeClr>
+                  </a:outerShdw>
+                </a:effectLst>
+              </a:rPr>
+              <a:t>page</a:t>
+            </a:r>
+            <a:r>
+              <a:rPr lang="de-DE" dirty="0">
+                <a:ln w="0"/>
+                <a:solidFill>
+                  <a:schemeClr val="tx1"/>
+                </a:solidFill>
+                <a:effectLst>
+                  <a:outerShdw blurRad="38100" dist="19050" dir="2700000" algn="tl" rotWithShape="0">
+                    <a:schemeClr val="dk1">
+                      <a:alpha val="40000"/>
+                    </a:schemeClr>
+                  </a:outerShdw>
+                </a:effectLst>
+              </a:rPr>
+              <a:t> x, not y.“</a:t>
             </a:r>
           </a:p>
         </p:txBody>
@@ -4267,8 +4449,8 @@
         </p:nvSpPr>
         <p:spPr>
           <a:xfrm>
-            <a:off x="1288232" y="3644280"/>
-            <a:ext cx="1656184" cy="1080120"/>
+            <a:off x="1288232" y="3644279"/>
+            <a:ext cx="2088232" cy="1594211"/>
           </a:xfrm>
           <a:prstGeom prst="rect">
             <a:avLst/>
@@ -4304,6 +4486,22 @@
           <a:p>
             <a:pPr algn="ctr"/>
             <a:r>
+              <a:rPr lang="de-DE" dirty="0">
+                <a:ln w="0"/>
+                <a:solidFill>
+                  <a:schemeClr val="tx1"/>
+                </a:solidFill>
+                <a:effectLst>
+                  <a:outerShdw blurRad="38100" dist="19050" dir="2700000" algn="tl" rotWithShape="0">
+                    <a:schemeClr val="dk1">
+                      <a:alpha val="40000"/>
+                    </a:schemeClr>
+                  </a:outerShdw>
+                </a:effectLst>
+              </a:rPr>
+              <a:t>„Finish </a:t>
+            </a:r>
+            <a:r>
               <a:rPr lang="de-DE" dirty="0" err="1">
                 <a:ln w="0"/>
                 <a:solidFill>
@@ -4317,7 +4515,7 @@
                   </a:outerShdw>
                 </a:effectLst>
               </a:rPr>
-              <a:t>Shouting</a:t>
+              <a:t>the</a:t>
             </a:r>
             <a:r>
               <a:rPr lang="de-DE" dirty="0">
@@ -4349,21 +4547,152 @@
                   </a:outerShdw>
                 </a:effectLst>
               </a:rPr>
-              <a:t>students</a:t>
-            </a:r>
-            <a:endParaRPr lang="de-DE" dirty="0">
-              <a:ln w="0"/>
-              <a:solidFill>
-                <a:schemeClr val="tx1"/>
-              </a:solidFill>
-              <a:effectLst>
-                <a:outerShdw blurRad="38100" dist="19050" dir="2700000" algn="tl" rotWithShape="0">
-                  <a:schemeClr val="dk1">
-                    <a:alpha val="40000"/>
-                  </a:schemeClr>
-                </a:outerShdw>
-              </a:effectLst>
-            </a:endParaRPr>
+              <a:t>task</a:t>
+            </a:r>
+            <a:r>
+              <a:rPr lang="de-DE" dirty="0">
+                <a:ln w="0"/>
+                <a:solidFill>
+                  <a:schemeClr val="tx1"/>
+                </a:solidFill>
+                <a:effectLst>
+                  <a:outerShdw blurRad="38100" dist="19050" dir="2700000" algn="tl" rotWithShape="0">
+                    <a:schemeClr val="dk1">
+                      <a:alpha val="40000"/>
+                    </a:schemeClr>
+                  </a:outerShdw>
+                </a:effectLst>
+              </a:rPr>
+              <a:t> </a:t>
+            </a:r>
+            <a:r>
+              <a:rPr lang="de-DE" dirty="0" err="1">
+                <a:ln w="0"/>
+                <a:solidFill>
+                  <a:schemeClr val="tx1"/>
+                </a:solidFill>
+                <a:effectLst>
+                  <a:outerShdw blurRad="38100" dist="19050" dir="2700000" algn="tl" rotWithShape="0">
+                    <a:schemeClr val="dk1">
+                      <a:alpha val="40000"/>
+                    </a:schemeClr>
+                  </a:outerShdw>
+                </a:effectLst>
+              </a:rPr>
+              <a:t>until</a:t>
+            </a:r>
+            <a:r>
+              <a:rPr lang="de-DE" dirty="0">
+                <a:ln w="0"/>
+                <a:solidFill>
+                  <a:schemeClr val="tx1"/>
+                </a:solidFill>
+                <a:effectLst>
+                  <a:outerShdw blurRad="38100" dist="19050" dir="2700000" algn="tl" rotWithShape="0">
+                    <a:schemeClr val="dk1">
+                      <a:alpha val="40000"/>
+                    </a:schemeClr>
+                  </a:outerShdw>
+                </a:effectLst>
+              </a:rPr>
+              <a:t> </a:t>
+            </a:r>
+            <a:r>
+              <a:rPr lang="de-DE" dirty="0" err="1">
+                <a:ln w="0"/>
+                <a:solidFill>
+                  <a:schemeClr val="tx1"/>
+                </a:solidFill>
+                <a:effectLst>
+                  <a:outerShdw blurRad="38100" dist="19050" dir="2700000" algn="tl" rotWithShape="0">
+                    <a:schemeClr val="dk1">
+                      <a:alpha val="40000"/>
+                    </a:schemeClr>
+                  </a:outerShdw>
+                </a:effectLst>
+              </a:rPr>
+              <a:t>the</a:t>
+            </a:r>
+            <a:r>
+              <a:rPr lang="de-DE" dirty="0">
+                <a:ln w="0"/>
+                <a:solidFill>
+                  <a:schemeClr val="tx1"/>
+                </a:solidFill>
+                <a:effectLst>
+                  <a:outerShdw blurRad="38100" dist="19050" dir="2700000" algn="tl" rotWithShape="0">
+                    <a:schemeClr val="dk1">
+                      <a:alpha val="40000"/>
+                    </a:schemeClr>
+                  </a:outerShdw>
+                </a:effectLst>
+              </a:rPr>
+              <a:t> end </a:t>
+            </a:r>
+            <a:r>
+              <a:rPr lang="de-DE" dirty="0" err="1">
+                <a:ln w="0"/>
+                <a:solidFill>
+                  <a:schemeClr val="tx1"/>
+                </a:solidFill>
+                <a:effectLst>
+                  <a:outerShdw blurRad="38100" dist="19050" dir="2700000" algn="tl" rotWithShape="0">
+                    <a:schemeClr val="dk1">
+                      <a:alpha val="40000"/>
+                    </a:schemeClr>
+                  </a:outerShdw>
+                </a:effectLst>
+              </a:rPr>
+              <a:t>of</a:t>
+            </a:r>
+            <a:r>
+              <a:rPr lang="de-DE" dirty="0">
+                <a:ln w="0"/>
+                <a:solidFill>
+                  <a:schemeClr val="tx1"/>
+                </a:solidFill>
+                <a:effectLst>
+                  <a:outerShdw blurRad="38100" dist="19050" dir="2700000" algn="tl" rotWithShape="0">
+                    <a:schemeClr val="dk1">
+                      <a:alpha val="40000"/>
+                    </a:schemeClr>
+                  </a:outerShdw>
+                </a:effectLst>
+              </a:rPr>
+              <a:t> </a:t>
+            </a:r>
+            <a:r>
+              <a:rPr lang="de-DE" dirty="0" err="1">
+                <a:ln w="0"/>
+                <a:solidFill>
+                  <a:schemeClr val="tx1"/>
+                </a:solidFill>
+                <a:effectLst>
+                  <a:outerShdw blurRad="38100" dist="19050" dir="2700000" algn="tl" rotWithShape="0">
+                    <a:schemeClr val="dk1">
+                      <a:alpha val="40000"/>
+                    </a:schemeClr>
+                  </a:outerShdw>
+                </a:effectLst>
+              </a:rPr>
+              <a:t>the</a:t>
+            </a:r>
+            <a:r>
+              <a:rPr lang="de-DE" dirty="0">
+                <a:ln w="0"/>
+                <a:solidFill>
+                  <a:schemeClr val="tx1"/>
+                </a:solidFill>
+                <a:effectLst>
+                  <a:outerShdw blurRad="38100" dist="19050" dir="2700000" algn="tl" rotWithShape="0">
+                    <a:schemeClr val="dk1">
+                      <a:alpha val="40000"/>
+                    </a:schemeClr>
+                  </a:outerShdw>
+                </a:effectLst>
+              </a:rPr>
+              <a:t> block.“</a:t>
+            </a:r>
           </a:p>
         </p:txBody>
       </p:sp>
@@ -4381,7 +4710,7 @@
         </p:nvSpPr>
         <p:spPr>
           <a:xfrm>
-            <a:off x="4772298" y="4928338"/>
+            <a:off x="4544529" y="5068690"/>
             <a:ext cx="2367880" cy="1722986"/>
           </a:xfrm>
           <a:prstGeom prst="rect">
@@ -4431,7 +4760,7 @@
                   </a:outerShdw>
                 </a:effectLst>
               </a:rPr>
-              <a:t>Asks </a:t>
+              <a:t>„Do </a:t>
             </a:r>
             <a:r>
               <a:rPr lang="de-DE" dirty="0" err="1">
@@ -4447,7 +4776,7 @@
                   </a:outerShdw>
                 </a:effectLst>
               </a:rPr>
-              <a:t>questions</a:t>
+              <a:t>we</a:t>
             </a:r>
             <a:r>
               <a:rPr lang="de-DE" dirty="0">
@@ -4479,7 +4808,7 @@
                   </a:outerShdw>
                 </a:effectLst>
               </a:rPr>
-              <a:t>about</a:t>
+              <a:t>have</a:t>
             </a:r>
             <a:r>
               <a:rPr lang="de-DE" dirty="0">
@@ -4511,7 +4840,7 @@
                   </a:outerShdw>
                 </a:effectLst>
               </a:rPr>
-              <a:t>learning</a:t>
+              <a:t>to</a:t>
             </a:r>
             <a:r>
               <a:rPr lang="de-DE" dirty="0">
@@ -4527,7 +4856,135 @@
                   </a:outerShdw>
                 </a:effectLst>
               </a:rPr>
-              <a:t> material</a:t>
+              <a:t> </a:t>
+            </a:r>
+            <a:r>
+              <a:rPr lang="de-DE" dirty="0" err="1">
+                <a:ln w="0"/>
+                <a:solidFill>
+                  <a:schemeClr val="tx1"/>
+                </a:solidFill>
+                <a:effectLst>
+                  <a:outerShdw blurRad="38100" dist="19050" dir="2700000" algn="tl" rotWithShape="0">
+                    <a:schemeClr val="dk1">
+                      <a:alpha val="40000"/>
+                    </a:schemeClr>
+                  </a:outerShdw>
+                </a:effectLst>
+              </a:rPr>
+              <a:t>include</a:t>
+            </a:r>
+            <a:r>
+              <a:rPr lang="de-DE" dirty="0">
+                <a:ln w="0"/>
+                <a:solidFill>
+                  <a:schemeClr val="tx1"/>
+                </a:solidFill>
+                <a:effectLst>
+                  <a:outerShdw blurRad="38100" dist="19050" dir="2700000" algn="tl" rotWithShape="0">
+                    <a:schemeClr val="dk1">
+                      <a:alpha val="40000"/>
+                    </a:schemeClr>
+                  </a:outerShdw>
+                </a:effectLst>
+              </a:rPr>
+              <a:t> </a:t>
+            </a:r>
+            <a:r>
+              <a:rPr lang="de-DE" dirty="0" err="1">
+                <a:ln w="0"/>
+                <a:solidFill>
+                  <a:schemeClr val="tx1"/>
+                </a:solidFill>
+                <a:effectLst>
+                  <a:outerShdw blurRad="38100" dist="19050" dir="2700000" algn="tl" rotWithShape="0">
+                    <a:schemeClr val="dk1">
+                      <a:alpha val="40000"/>
+                    </a:schemeClr>
+                  </a:outerShdw>
+                </a:effectLst>
+              </a:rPr>
+              <a:t>this</a:t>
+            </a:r>
+            <a:r>
+              <a:rPr lang="de-DE" dirty="0">
+                <a:ln w="0"/>
+                <a:solidFill>
+                  <a:schemeClr val="tx1"/>
+                </a:solidFill>
+                <a:effectLst>
+                  <a:outerShdw blurRad="38100" dist="19050" dir="2700000" algn="tl" rotWithShape="0">
+                    <a:schemeClr val="dk1">
+                      <a:alpha val="40000"/>
+                    </a:schemeClr>
+                  </a:outerShdw>
+                </a:effectLst>
+              </a:rPr>
+              <a:t> in </a:t>
+            </a:r>
+            <a:r>
+              <a:rPr lang="de-DE" dirty="0" err="1">
+                <a:ln w="0"/>
+                <a:solidFill>
+                  <a:schemeClr val="tx1"/>
+                </a:solidFill>
+                <a:effectLst>
+                  <a:outerShdw blurRad="38100" dist="19050" dir="2700000" algn="tl" rotWithShape="0">
+                    <a:schemeClr val="dk1">
+                      <a:alpha val="40000"/>
+                    </a:schemeClr>
+                  </a:outerShdw>
+                </a:effectLst>
+              </a:rPr>
+              <a:t>the</a:t>
+            </a:r>
+            <a:r>
+              <a:rPr lang="de-DE" dirty="0">
+                <a:ln w="0"/>
+                <a:solidFill>
+                  <a:schemeClr val="tx1"/>
+                </a:solidFill>
+                <a:effectLst>
+                  <a:outerShdw blurRad="38100" dist="19050" dir="2700000" algn="tl" rotWithShape="0">
+                    <a:schemeClr val="dk1">
+                      <a:alpha val="40000"/>
+                    </a:schemeClr>
+                  </a:outerShdw>
+                </a:effectLst>
+              </a:rPr>
+              <a:t> final </a:t>
+            </a:r>
+            <a:r>
+              <a:rPr lang="de-DE" dirty="0" err="1">
+                <a:ln w="0"/>
+                <a:solidFill>
+                  <a:schemeClr val="tx1"/>
+                </a:solidFill>
+                <a:effectLst>
+                  <a:outerShdw blurRad="38100" dist="19050" dir="2700000" algn="tl" rotWithShape="0">
+                    <a:schemeClr val="dk1">
+                      <a:alpha val="40000"/>
+                    </a:schemeClr>
+                  </a:outerShdw>
+                </a:effectLst>
+              </a:rPr>
+              <a:t>product</a:t>
+            </a:r>
+            <a:r>
+              <a:rPr lang="de-DE" dirty="0">
+                <a:ln w="0"/>
+                <a:solidFill>
+                  <a:schemeClr val="tx1"/>
+                </a:solidFill>
+                <a:effectLst>
+                  <a:outerShdw blurRad="38100" dist="19050" dir="2700000" algn="tl" rotWithShape="0">
+                    <a:schemeClr val="dk1">
+                      <a:alpha val="40000"/>
+                    </a:schemeClr>
+                  </a:outerShdw>
+                </a:effectLst>
+              </a:rPr>
+              <a:t>?“</a:t>
             </a:r>
           </a:p>
         </p:txBody>
@@ -4546,7 +5003,7 @@
         </p:nvSpPr>
         <p:spPr>
           <a:xfrm>
-            <a:off x="7428210" y="6325456"/>
+            <a:off x="7459859" y="6720729"/>
             <a:ext cx="1656184" cy="1080120"/>
           </a:xfrm>
           <a:prstGeom prst="rect">
@@ -5071,8 +5528,8 @@
         </p:nvSpPr>
         <p:spPr>
           <a:xfrm>
-            <a:off x="7112788" y="673630"/>
-            <a:ext cx="1656184" cy="1080120"/>
+            <a:off x="7320616" y="402065"/>
+            <a:ext cx="2103546" cy="1687498"/>
           </a:xfrm>
           <a:prstGeom prst="rect">
             <a:avLst/>
@@ -5108,6 +5565,22 @@
           <a:p>
             <a:pPr algn="ctr"/>
             <a:r>
+              <a:rPr lang="de-DE" dirty="0">
+                <a:ln w="0"/>
+                <a:solidFill>
+                  <a:schemeClr val="tx1"/>
+                </a:solidFill>
+                <a:effectLst>
+                  <a:outerShdw blurRad="38100" dist="19050" dir="2700000" algn="tl" rotWithShape="0">
+                    <a:schemeClr val="dk1">
+                      <a:alpha val="40000"/>
+                    </a:schemeClr>
+                  </a:outerShdw>
+                </a:effectLst>
+              </a:rPr>
+              <a:t>„</a:t>
+            </a:r>
+            <a:r>
               <a:rPr lang="de-DE" dirty="0" err="1">
                 <a:ln w="0"/>
                 <a:solidFill>
@@ -5121,7 +5594,7 @@
                   </a:outerShdw>
                 </a:effectLst>
               </a:rPr>
-              <a:t>Stressed</a:t>
+              <a:t>Where</a:t>
             </a:r>
             <a:r>
               <a:rPr lang="de-DE" dirty="0">
@@ -5137,7 +5610,7 @@
                   </a:outerShdw>
                 </a:effectLst>
               </a:rPr>
-              <a:t> out </a:t>
+              <a:t> </a:t>
             </a:r>
             <a:r>
               <a:rPr lang="de-DE" dirty="0" err="1">
@@ -5153,7 +5626,7 @@
                   </a:outerShdw>
                 </a:effectLst>
               </a:rPr>
-              <a:t>by</a:t>
+              <a:t>were</a:t>
             </a:r>
             <a:r>
               <a:rPr lang="de-DE" dirty="0">
@@ -5185,21 +5658,120 @@
                   </a:outerShdw>
                 </a:effectLst>
               </a:rPr>
-              <a:t>school</a:t>
-            </a:r>
-            <a:endParaRPr lang="de-DE" dirty="0">
-              <a:ln w="0"/>
-              <a:solidFill>
-                <a:schemeClr val="tx1"/>
-              </a:solidFill>
-              <a:effectLst>
-                <a:outerShdw blurRad="38100" dist="19050" dir="2700000" algn="tl" rotWithShape="0">
-                  <a:schemeClr val="dk1">
-                    <a:alpha val="40000"/>
-                  </a:schemeClr>
-                </a:outerShdw>
-              </a:effectLst>
-            </a:endParaRPr>
+              <a:t>the</a:t>
+            </a:r>
+            <a:r>
+              <a:rPr lang="de-DE" dirty="0">
+                <a:ln w="0"/>
+                <a:solidFill>
+                  <a:schemeClr val="tx1"/>
+                </a:solidFill>
+                <a:effectLst>
+                  <a:outerShdw blurRad="38100" dist="19050" dir="2700000" algn="tl" rotWithShape="0">
+                    <a:schemeClr val="dk1">
+                      <a:alpha val="40000"/>
+                    </a:schemeClr>
+                  </a:outerShdw>
+                </a:effectLst>
+              </a:rPr>
+              <a:t> </a:t>
+            </a:r>
+            <a:r>
+              <a:rPr lang="de-DE" dirty="0" err="1">
+                <a:ln w="0"/>
+                <a:solidFill>
+                  <a:schemeClr val="tx1"/>
+                </a:solidFill>
+                <a:effectLst>
+                  <a:outerShdw blurRad="38100" dist="19050" dir="2700000" algn="tl" rotWithShape="0">
+                    <a:schemeClr val="dk1">
+                      <a:alpha val="40000"/>
+                    </a:schemeClr>
+                  </a:outerShdw>
+                </a:effectLst>
+              </a:rPr>
+              <a:t>right</a:t>
+            </a:r>
+            <a:r>
+              <a:rPr lang="de-DE" dirty="0">
+                <a:ln w="0"/>
+                <a:solidFill>
+                  <a:schemeClr val="tx1"/>
+                </a:solidFill>
+                <a:effectLst>
+                  <a:outerShdw blurRad="38100" dist="19050" dir="2700000" algn="tl" rotWithShape="0">
+                    <a:schemeClr val="dk1">
+                      <a:alpha val="40000"/>
+                    </a:schemeClr>
+                  </a:outerShdw>
+                </a:effectLst>
+              </a:rPr>
+              <a:t> </a:t>
+            </a:r>
+            <a:r>
+              <a:rPr lang="de-DE" dirty="0" err="1">
+                <a:ln w="0"/>
+                <a:solidFill>
+                  <a:schemeClr val="tx1"/>
+                </a:solidFill>
+                <a:effectLst>
+                  <a:outerShdw blurRad="38100" dist="19050" dir="2700000" algn="tl" rotWithShape="0">
+                    <a:schemeClr val="dk1">
+                      <a:alpha val="40000"/>
+                    </a:schemeClr>
+                  </a:outerShdw>
+                </a:effectLst>
+              </a:rPr>
+              <a:t>requirements</a:t>
+            </a:r>
+            <a:r>
+              <a:rPr lang="de-DE" dirty="0">
+                <a:ln w="0"/>
+                <a:solidFill>
+                  <a:schemeClr val="tx1"/>
+                </a:solidFill>
+                <a:effectLst>
+                  <a:outerShdw blurRad="38100" dist="19050" dir="2700000" algn="tl" rotWithShape="0">
+                    <a:schemeClr val="dk1">
+                      <a:alpha val="40000"/>
+                    </a:schemeClr>
+                  </a:outerShdw>
+                </a:effectLst>
+              </a:rPr>
+              <a:t> </a:t>
+            </a:r>
+            <a:r>
+              <a:rPr lang="de-DE" dirty="0" err="1">
+                <a:ln w="0"/>
+                <a:solidFill>
+                  <a:schemeClr val="tx1"/>
+                </a:solidFill>
+                <a:effectLst>
+                  <a:outerShdw blurRad="38100" dist="19050" dir="2700000" algn="tl" rotWithShape="0">
+                    <a:schemeClr val="dk1">
+                      <a:alpha val="40000"/>
+                    </a:schemeClr>
+                  </a:outerShdw>
+                </a:effectLst>
+              </a:rPr>
+              <a:t>again</a:t>
+            </a:r>
+            <a:r>
+              <a:rPr lang="de-DE" dirty="0">
+                <a:ln w="0"/>
+                <a:solidFill>
+                  <a:schemeClr val="tx1"/>
+                </a:solidFill>
+                <a:effectLst>
+                  <a:outerShdw blurRad="38100" dist="19050" dir="2700000" algn="tl" rotWithShape="0">
+                    <a:schemeClr val="dk1">
+                      <a:alpha val="40000"/>
+                    </a:schemeClr>
+                  </a:outerShdw>
+                </a:effectLst>
+              </a:rPr>
+              <a:t>?“</a:t>
+            </a:r>
           </a:p>
         </p:txBody>
       </p:sp>
@@ -5217,7 +5789,7 @@
         </p:nvSpPr>
         <p:spPr>
           <a:xfrm>
-            <a:off x="1288232" y="4932602"/>
+            <a:off x="216024" y="5611523"/>
             <a:ext cx="1800200" cy="1080120"/>
           </a:xfrm>
           <a:prstGeom prst="rect">
@@ -5396,6 +5968,528 @@
                 </a:outerShdw>
               </a:effectLst>
             </a:endParaRPr>
+          </a:p>
+        </p:txBody>
+      </p:sp>
+      <p:sp>
+        <p:nvSpPr>
+          <p:cNvPr id="3" name="Rechteck 2">
+            <a:extLst>
+              <a:ext uri="{FF2B5EF4-FFF2-40B4-BE49-F238E27FC236}">
+                <a16:creationId xmlns:a16="http://schemas.microsoft.com/office/drawing/2014/main" id="{12BF09B5-3883-2D28-CBA1-1819898D31DD}"/>
+              </a:ext>
+            </a:extLst>
+          </p:cNvPr>
+          <p:cNvSpPr/>
+          <p:nvPr/>
+        </p:nvSpPr>
+        <p:spPr>
+          <a:xfrm>
+            <a:off x="4642455" y="2133963"/>
+            <a:ext cx="2660685" cy="1799964"/>
+          </a:xfrm>
+          <a:prstGeom prst="rect">
+            <a:avLst/>
+          </a:prstGeom>
+        </p:spPr>
+        <p:style>
+          <a:lnRef idx="1">
+            <a:schemeClr val="accent5"/>
+          </a:lnRef>
+          <a:fillRef idx="2">
+            <a:schemeClr val="accent5"/>
+          </a:fillRef>
+          <a:effectRef idx="1">
+            <a:schemeClr val="accent5"/>
+          </a:effectRef>
+          <a:fontRef idx="minor">
+            <a:schemeClr val="dk1"/>
+          </a:fontRef>
+        </p:style>
+        <p:txBody>
+          <a:bodyPr rtlCol="0" anchor="ctr">
+            <a:scene3d>
+              <a:camera prst="orthographicFront"/>
+              <a:lightRig rig="soft" dir="t">
+                <a:rot lat="0" lon="0" rev="15600000"/>
+              </a:lightRig>
+            </a:scene3d>
+            <a:sp3d extrusionH="57150" prstMaterial="softEdge">
+              <a:bevelT w="25400" h="38100"/>
+            </a:sp3d>
+          </a:bodyPr>
+          <a:lstStyle/>
+          <a:p>
+            <a:pPr algn="ctr"/>
+            <a:r>
+              <a:rPr lang="de-DE" dirty="0">
+                <a:ln w="0"/>
+                <a:solidFill>
+                  <a:schemeClr val="tx1"/>
+                </a:solidFill>
+                <a:effectLst>
+                  <a:outerShdw blurRad="38100" dist="19050" dir="2700000" algn="tl" rotWithShape="0">
+                    <a:schemeClr val="dk1">
+                      <a:alpha val="40000"/>
+                    </a:schemeClr>
+                  </a:outerShdw>
+                </a:effectLst>
+              </a:rPr>
+              <a:t>„</a:t>
+            </a:r>
+            <a:r>
+              <a:rPr lang="de-DE" dirty="0" err="1">
+                <a:ln w="0"/>
+                <a:solidFill>
+                  <a:schemeClr val="tx1"/>
+                </a:solidFill>
+                <a:effectLst>
+                  <a:outerShdw blurRad="38100" dist="19050" dir="2700000" algn="tl" rotWithShape="0">
+                    <a:schemeClr val="dk1">
+                      <a:alpha val="40000"/>
+                    </a:schemeClr>
+                  </a:outerShdw>
+                </a:effectLst>
+              </a:rPr>
+              <a:t>Why</a:t>
+            </a:r>
+            <a:r>
+              <a:rPr lang="de-DE" dirty="0">
+                <a:ln w="0"/>
+                <a:solidFill>
+                  <a:schemeClr val="tx1"/>
+                </a:solidFill>
+                <a:effectLst>
+                  <a:outerShdw blurRad="38100" dist="19050" dir="2700000" algn="tl" rotWithShape="0">
+                    <a:schemeClr val="dk1">
+                      <a:alpha val="40000"/>
+                    </a:schemeClr>
+                  </a:outerShdw>
+                </a:effectLst>
+              </a:rPr>
+              <a:t> do i </a:t>
+            </a:r>
+            <a:r>
+              <a:rPr lang="de-DE" dirty="0" err="1">
+                <a:ln w="0"/>
+                <a:solidFill>
+                  <a:schemeClr val="tx1"/>
+                </a:solidFill>
+                <a:effectLst>
+                  <a:outerShdw blurRad="38100" dist="19050" dir="2700000" algn="tl" rotWithShape="0">
+                    <a:schemeClr val="dk1">
+                      <a:alpha val="40000"/>
+                    </a:schemeClr>
+                  </a:outerShdw>
+                </a:effectLst>
+              </a:rPr>
+              <a:t>always</a:t>
+            </a:r>
+            <a:r>
+              <a:rPr lang="de-DE" dirty="0">
+                <a:ln w="0"/>
+                <a:solidFill>
+                  <a:schemeClr val="tx1"/>
+                </a:solidFill>
+                <a:effectLst>
+                  <a:outerShdw blurRad="38100" dist="19050" dir="2700000" algn="tl" rotWithShape="0">
+                    <a:schemeClr val="dk1">
+                      <a:alpha val="40000"/>
+                    </a:schemeClr>
+                  </a:outerShdw>
+                </a:effectLst>
+              </a:rPr>
+              <a:t> </a:t>
+            </a:r>
+            <a:r>
+              <a:rPr lang="de-DE" dirty="0" err="1">
+                <a:ln w="0"/>
+                <a:solidFill>
+                  <a:schemeClr val="tx1"/>
+                </a:solidFill>
+                <a:effectLst>
+                  <a:outerShdw blurRad="38100" dist="19050" dir="2700000" algn="tl" rotWithShape="0">
+                    <a:schemeClr val="dk1">
+                      <a:alpha val="40000"/>
+                    </a:schemeClr>
+                  </a:outerShdw>
+                </a:effectLst>
+              </a:rPr>
+              <a:t>have</a:t>
+            </a:r>
+            <a:r>
+              <a:rPr lang="de-DE" dirty="0">
+                <a:ln w="0"/>
+                <a:solidFill>
+                  <a:schemeClr val="tx1"/>
+                </a:solidFill>
+                <a:effectLst>
+                  <a:outerShdw blurRad="38100" dist="19050" dir="2700000" algn="tl" rotWithShape="0">
+                    <a:schemeClr val="dk1">
+                      <a:alpha val="40000"/>
+                    </a:schemeClr>
+                  </a:outerShdw>
+                </a:effectLst>
+              </a:rPr>
+              <a:t> </a:t>
+            </a:r>
+            <a:r>
+              <a:rPr lang="de-DE" dirty="0" err="1">
+                <a:ln w="0"/>
+                <a:solidFill>
+                  <a:schemeClr val="tx1"/>
+                </a:solidFill>
+                <a:effectLst>
+                  <a:outerShdw blurRad="38100" dist="19050" dir="2700000" algn="tl" rotWithShape="0">
+                    <a:schemeClr val="dk1">
+                      <a:alpha val="40000"/>
+                    </a:schemeClr>
+                  </a:outerShdw>
+                </a:effectLst>
+              </a:rPr>
+              <a:t>to</a:t>
+            </a:r>
+            <a:r>
+              <a:rPr lang="de-DE" dirty="0">
+                <a:ln w="0"/>
+                <a:solidFill>
+                  <a:schemeClr val="tx1"/>
+                </a:solidFill>
+                <a:effectLst>
+                  <a:outerShdw blurRad="38100" dist="19050" dir="2700000" algn="tl" rotWithShape="0">
+                    <a:schemeClr val="dk1">
+                      <a:alpha val="40000"/>
+                    </a:schemeClr>
+                  </a:outerShdw>
+                </a:effectLst>
+              </a:rPr>
+              <a:t> </a:t>
+            </a:r>
+            <a:r>
+              <a:rPr lang="de-DE" dirty="0" err="1">
+                <a:ln w="0"/>
+                <a:solidFill>
+                  <a:schemeClr val="tx1"/>
+                </a:solidFill>
+                <a:effectLst>
+                  <a:outerShdw blurRad="38100" dist="19050" dir="2700000" algn="tl" rotWithShape="0">
+                    <a:schemeClr val="dk1">
+                      <a:alpha val="40000"/>
+                    </a:schemeClr>
+                  </a:outerShdw>
+                </a:effectLst>
+              </a:rPr>
+              <a:t>use</a:t>
+            </a:r>
+            <a:r>
+              <a:rPr lang="de-DE" dirty="0">
+                <a:ln w="0"/>
+                <a:solidFill>
+                  <a:schemeClr val="tx1"/>
+                </a:solidFill>
+                <a:effectLst>
+                  <a:outerShdw blurRad="38100" dist="19050" dir="2700000" algn="tl" rotWithShape="0">
+                    <a:schemeClr val="dk1">
+                      <a:alpha val="40000"/>
+                    </a:schemeClr>
+                  </a:outerShdw>
+                </a:effectLst>
+              </a:rPr>
+              <a:t> </a:t>
+            </a:r>
+            <a:r>
+              <a:rPr lang="de-DE" dirty="0" err="1">
+                <a:ln w="0"/>
+                <a:solidFill>
+                  <a:schemeClr val="tx1"/>
+                </a:solidFill>
+                <a:effectLst>
+                  <a:outerShdw blurRad="38100" dist="19050" dir="2700000" algn="tl" rotWithShape="0">
+                    <a:schemeClr val="dk1">
+                      <a:alpha val="40000"/>
+                    </a:schemeClr>
+                  </a:outerShdw>
+                </a:effectLst>
+              </a:rPr>
+              <a:t>the</a:t>
+            </a:r>
+            <a:r>
+              <a:rPr lang="de-DE" dirty="0">
+                <a:ln w="0"/>
+                <a:solidFill>
+                  <a:schemeClr val="tx1"/>
+                </a:solidFill>
+                <a:effectLst>
+                  <a:outerShdw blurRad="38100" dist="19050" dir="2700000" algn="tl" rotWithShape="0">
+                    <a:schemeClr val="dk1">
+                      <a:alpha val="40000"/>
+                    </a:schemeClr>
+                  </a:outerShdw>
+                </a:effectLst>
+              </a:rPr>
+              <a:t> </a:t>
+            </a:r>
+            <a:r>
+              <a:rPr lang="de-DE" dirty="0" err="1">
+                <a:ln w="0"/>
+                <a:solidFill>
+                  <a:schemeClr val="tx1"/>
+                </a:solidFill>
+                <a:effectLst>
+                  <a:outerShdw blurRad="38100" dist="19050" dir="2700000" algn="tl" rotWithShape="0">
+                    <a:schemeClr val="dk1">
+                      <a:alpha val="40000"/>
+                    </a:schemeClr>
+                  </a:outerShdw>
+                </a:effectLst>
+              </a:rPr>
+              <a:t>enrollment</a:t>
+            </a:r>
+            <a:r>
+              <a:rPr lang="de-DE" dirty="0">
+                <a:ln w="0"/>
+                <a:solidFill>
+                  <a:schemeClr val="tx1"/>
+                </a:solidFill>
+                <a:effectLst>
+                  <a:outerShdw blurRad="38100" dist="19050" dir="2700000" algn="tl" rotWithShape="0">
+                    <a:schemeClr val="dk1">
+                      <a:alpha val="40000"/>
+                    </a:schemeClr>
+                  </a:outerShdw>
+                </a:effectLst>
+              </a:rPr>
+              <a:t> </a:t>
+            </a:r>
+            <a:r>
+              <a:rPr lang="de-DE" dirty="0" err="1">
+                <a:ln w="0"/>
+                <a:solidFill>
+                  <a:schemeClr val="tx1"/>
+                </a:solidFill>
+                <a:effectLst>
+                  <a:outerShdw blurRad="38100" dist="19050" dir="2700000" algn="tl" rotWithShape="0">
+                    <a:schemeClr val="dk1">
+                      <a:alpha val="40000"/>
+                    </a:schemeClr>
+                  </a:outerShdw>
+                </a:effectLst>
+              </a:rPr>
+              <a:t>phrase</a:t>
+            </a:r>
+            <a:r>
+              <a:rPr lang="de-DE" dirty="0">
+                <a:ln w="0"/>
+                <a:solidFill>
+                  <a:schemeClr val="tx1"/>
+                </a:solidFill>
+                <a:effectLst>
+                  <a:outerShdw blurRad="38100" dist="19050" dir="2700000" algn="tl" rotWithShape="0">
+                    <a:schemeClr val="dk1">
+                      <a:alpha val="40000"/>
+                    </a:schemeClr>
+                  </a:outerShdw>
+                </a:effectLst>
+              </a:rPr>
+              <a:t>?“</a:t>
+            </a:r>
+          </a:p>
+        </p:txBody>
+      </p:sp>
+      <p:sp>
+        <p:nvSpPr>
+          <p:cNvPr id="8" name="Rechteck 7">
+            <a:extLst>
+              <a:ext uri="{FF2B5EF4-FFF2-40B4-BE49-F238E27FC236}">
+                <a16:creationId xmlns:a16="http://schemas.microsoft.com/office/drawing/2014/main" id="{9BC03C63-E830-1F9C-DA70-D737C106A6D0}"/>
+              </a:ext>
+            </a:extLst>
+          </p:cNvPr>
+          <p:cNvSpPr/>
+          <p:nvPr/>
+        </p:nvSpPr>
+        <p:spPr>
+          <a:xfrm>
+            <a:off x="7008095" y="5311383"/>
+            <a:ext cx="1857598" cy="1325676"/>
+          </a:xfrm>
+          <a:prstGeom prst="rect">
+            <a:avLst/>
+          </a:prstGeom>
+        </p:spPr>
+        <p:style>
+          <a:lnRef idx="1">
+            <a:schemeClr val="accent5"/>
+          </a:lnRef>
+          <a:fillRef idx="2">
+            <a:schemeClr val="accent5"/>
+          </a:fillRef>
+          <a:effectRef idx="1">
+            <a:schemeClr val="accent5"/>
+          </a:effectRef>
+          <a:fontRef idx="minor">
+            <a:schemeClr val="dk1"/>
+          </a:fontRef>
+        </p:style>
+        <p:txBody>
+          <a:bodyPr rtlCol="0" anchor="ctr">
+            <a:scene3d>
+              <a:camera prst="orthographicFront"/>
+              <a:lightRig rig="soft" dir="t">
+                <a:rot lat="0" lon="0" rev="15600000"/>
+              </a:lightRig>
+            </a:scene3d>
+            <a:sp3d extrusionH="57150" prstMaterial="softEdge">
+              <a:bevelT w="25400" h="38100"/>
+            </a:sp3d>
+          </a:bodyPr>
+          <a:lstStyle/>
+          <a:p>
+            <a:pPr algn="ctr"/>
+            <a:r>
+              <a:rPr lang="de-DE" dirty="0">
+                <a:ln w="0"/>
+                <a:solidFill>
+                  <a:schemeClr val="tx1"/>
+                </a:solidFill>
+                <a:effectLst>
+                  <a:outerShdw blurRad="38100" dist="19050" dir="2700000" algn="tl" rotWithShape="0">
+                    <a:schemeClr val="dk1">
+                      <a:alpha val="40000"/>
+                    </a:schemeClr>
+                  </a:outerShdw>
+                </a:effectLst>
+              </a:rPr>
+              <a:t>„Can </a:t>
+            </a:r>
+            <a:r>
+              <a:rPr lang="de-DE" dirty="0" err="1">
+                <a:ln w="0"/>
+                <a:solidFill>
+                  <a:schemeClr val="tx1"/>
+                </a:solidFill>
+                <a:effectLst>
+                  <a:outerShdw blurRad="38100" dist="19050" dir="2700000" algn="tl" rotWithShape="0">
+                    <a:schemeClr val="dk1">
+                      <a:alpha val="40000"/>
+                    </a:schemeClr>
+                  </a:outerShdw>
+                </a:effectLst>
+              </a:rPr>
+              <a:t>we</a:t>
+            </a:r>
+            <a:r>
+              <a:rPr lang="de-DE" dirty="0">
+                <a:ln w="0"/>
+                <a:solidFill>
+                  <a:schemeClr val="tx1"/>
+                </a:solidFill>
+                <a:effectLst>
+                  <a:outerShdw blurRad="38100" dist="19050" dir="2700000" algn="tl" rotWithShape="0">
+                    <a:schemeClr val="dk1">
+                      <a:alpha val="40000"/>
+                    </a:schemeClr>
+                  </a:outerShdw>
+                </a:effectLst>
+              </a:rPr>
+              <a:t> </a:t>
+            </a:r>
+            <a:r>
+              <a:rPr lang="de-DE" dirty="0" err="1">
+                <a:ln w="0"/>
+                <a:solidFill>
+                  <a:schemeClr val="tx1"/>
+                </a:solidFill>
+                <a:effectLst>
+                  <a:outerShdw blurRad="38100" dist="19050" dir="2700000" algn="tl" rotWithShape="0">
+                    <a:schemeClr val="dk1">
+                      <a:alpha val="40000"/>
+                    </a:schemeClr>
+                  </a:outerShdw>
+                </a:effectLst>
+              </a:rPr>
+              <a:t>go</a:t>
+            </a:r>
+            <a:r>
+              <a:rPr lang="de-DE" dirty="0">
+                <a:ln w="0"/>
+                <a:solidFill>
+                  <a:schemeClr val="tx1"/>
+                </a:solidFill>
+                <a:effectLst>
+                  <a:outerShdw blurRad="38100" dist="19050" dir="2700000" algn="tl" rotWithShape="0">
+                    <a:schemeClr val="dk1">
+                      <a:alpha val="40000"/>
+                    </a:schemeClr>
+                  </a:outerShdw>
+                </a:effectLst>
+              </a:rPr>
+              <a:t> </a:t>
+            </a:r>
+            <a:r>
+              <a:rPr lang="de-DE" dirty="0" err="1">
+                <a:ln w="0"/>
+                <a:solidFill>
+                  <a:schemeClr val="tx1"/>
+                </a:solidFill>
+                <a:effectLst>
+                  <a:outerShdw blurRad="38100" dist="19050" dir="2700000" algn="tl" rotWithShape="0">
+                    <a:schemeClr val="dk1">
+                      <a:alpha val="40000"/>
+                    </a:schemeClr>
+                  </a:outerShdw>
+                </a:effectLst>
+              </a:rPr>
+              <a:t>earlier</a:t>
+            </a:r>
+            <a:r>
+              <a:rPr lang="de-DE" dirty="0">
+                <a:ln w="0"/>
+                <a:solidFill>
+                  <a:schemeClr val="tx1"/>
+                </a:solidFill>
+                <a:effectLst>
+                  <a:outerShdw blurRad="38100" dist="19050" dir="2700000" algn="tl" rotWithShape="0">
+                    <a:schemeClr val="dk1">
+                      <a:alpha val="40000"/>
+                    </a:schemeClr>
+                  </a:outerShdw>
+                </a:effectLst>
+              </a:rPr>
+              <a:t> </a:t>
+            </a:r>
+            <a:r>
+              <a:rPr lang="de-DE" dirty="0" err="1">
+                <a:ln w="0"/>
+                <a:solidFill>
+                  <a:schemeClr val="tx1"/>
+                </a:solidFill>
+                <a:effectLst>
+                  <a:outerShdw blurRad="38100" dist="19050" dir="2700000" algn="tl" rotWithShape="0">
+                    <a:schemeClr val="dk1">
+                      <a:alpha val="40000"/>
+                    </a:schemeClr>
+                  </a:outerShdw>
+                </a:effectLst>
+              </a:rPr>
+              <a:t>today</a:t>
+            </a:r>
+            <a:r>
+              <a:rPr lang="de-DE" dirty="0">
+                <a:ln w="0"/>
+                <a:solidFill>
+                  <a:schemeClr val="tx1"/>
+                </a:solidFill>
+                <a:effectLst>
+                  <a:outerShdw blurRad="38100" dist="19050" dir="2700000" algn="tl" rotWithShape="0">
+                    <a:schemeClr val="dk1">
+                      <a:alpha val="40000"/>
+                    </a:schemeClr>
+                  </a:outerShdw>
+                </a:effectLst>
+              </a:rPr>
+              <a:t>?“</a:t>
+            </a:r>
           </a:p>
         </p:txBody>
       </p:sp>
@@ -6209,15 +7303,6 @@
 </file>
 
 <file path=customXml/item1.xml><?xml version="1.0" encoding="utf-8"?>
-<?mso-contentType ?>
-<FormTemplates xmlns="http://schemas.microsoft.com/sharepoint/v3/contenttype/forms">
-  <Display>DocumentLibraryForm</Display>
-  <Edit>DocumentLibraryForm</Edit>
-  <New>DocumentLibraryForm</New>
-</FormTemplates>
-</file>
-
-<file path=customXml/item2.xml><?xml version="1.0" encoding="utf-8"?>
 <ct:contentTypeSchema xmlns:ct="http://schemas.microsoft.com/office/2006/metadata/contentType" xmlns:ma="http://schemas.microsoft.com/office/2006/metadata/properties/metaAttributes" ct:_="" ma:_="" ma:contentTypeName="Dokument" ma:contentTypeID="0x010100C3CF281051373D4796C8C37A57573E27" ma:contentTypeVersion="0" ma:contentTypeDescription="Ein neues Dokument erstellen." ma:contentTypeScope="" ma:versionID="8dfbeedf2c0aac0c8a2115f405c926fe">
   <xsd:schema xmlns:xsd="http://www.w3.org/2001/XMLSchema" xmlns:xs="http://www.w3.org/2001/XMLSchema" xmlns:p="http://schemas.microsoft.com/office/2006/metadata/properties" targetNamespace="http://schemas.microsoft.com/office/2006/metadata/properties" ma:root="true" ma:fieldsID="b4f5dc90cf06628c3b90945c8266c24d">
     <xsd:element name="properties">
@@ -6331,21 +7416,22 @@
 </ct:contentTypeSchema>
 </file>
 
-<file path=customXml/item3.xml><?xml version="1.0" encoding="utf-8"?>
+<file path=customXml/item2.xml><?xml version="1.0" encoding="utf-8"?>
 <p:properties xmlns:p="http://schemas.microsoft.com/office/2006/metadata/properties" xmlns:xsi="http://www.w3.org/2001/XMLSchema-instance" xmlns:pc="http://schemas.microsoft.com/office/infopath/2007/PartnerControls">
   <documentManagement/>
 </p:properties>
 </file>
 
-<file path=customXml/itemProps1.xml><?xml version="1.0" encoding="utf-8"?>
-<ds:datastoreItem xmlns:ds="http://schemas.openxmlformats.org/officeDocument/2006/customXml" ds:itemID="{2560473F-4151-409F-B5E0-CC5CF4754B28}">
-  <ds:schemaRefs>
-    <ds:schemaRef ds:uri="http://schemas.microsoft.com/sharepoint/v3/contenttype/forms"/>
-  </ds:schemaRefs>
-</ds:datastoreItem>
+<file path=customXml/item3.xml><?xml version="1.0" encoding="utf-8"?>
+<?mso-contentType ?>
+<FormTemplates xmlns="http://schemas.microsoft.com/sharepoint/v3/contenttype/forms">
+  <Display>DocumentLibraryForm</Display>
+  <Edit>DocumentLibraryForm</Edit>
+  <New>DocumentLibraryForm</New>
+</FormTemplates>
 </file>
 
-<file path=customXml/itemProps2.xml><?xml version="1.0" encoding="utf-8"?>
+<file path=customXml/itemProps1.xml><?xml version="1.0" encoding="utf-8"?>
 <ds:datastoreItem xmlns:ds="http://schemas.openxmlformats.org/officeDocument/2006/customXml" ds:itemID="{B1FBE66F-27D3-4A44-A092-5B664C504A63}">
   <ds:schemaRefs>
     <ds:schemaRef ds:uri="http://schemas.microsoft.com/office/2006/metadata/contentType"/>
@@ -6361,7 +7447,7 @@
 </ds:datastoreItem>
 </file>
 
-<file path=customXml/itemProps3.xml><?xml version="1.0" encoding="utf-8"?>
+<file path=customXml/itemProps2.xml><?xml version="1.0" encoding="utf-8"?>
 <ds:datastoreItem xmlns:ds="http://schemas.openxmlformats.org/officeDocument/2006/customXml" ds:itemID="{7AECA3E6-3633-4397-B495-559E0FCCF70D}">
   <ds:schemaRefs>
     <ds:schemaRef ds:uri="http://purl.org/dc/terms/"/>
@@ -6374,4 +7460,12 @@
     <ds:schemaRef ds:uri="http://purl.org/dc/dcmitype/"/>
   </ds:schemaRefs>
 </ds:datastoreItem>
+</file>
+
+<file path=customXml/itemProps3.xml><?xml version="1.0" encoding="utf-8"?>
+<ds:datastoreItem xmlns:ds="http://schemas.openxmlformats.org/officeDocument/2006/customXml" ds:itemID="{2560473F-4151-409F-B5E0-CC5CF4754B28}">
+  <ds:schemaRefs>
+    <ds:schemaRef ds:uri="http://schemas.microsoft.com/sharepoint/v3/contenttype/forms"/>
+  </ds:schemaRefs>
+</ds:datastoreItem>
 </file>
</xml_diff>